<commit_message>
Complet Score Sight Service presantation
</commit_message>
<xml_diff>
--- a/Score Sight Service.pptx
+++ b/Score Sight Service.pptx
@@ -5,12 +5,18 @@
     <p:sldMasterId id="2147483732" r:id="rId1"/>
   </p:sldMasterIdLst>
   <p:notesMasterIdLst>
-    <p:notesMasterId r:id="rId5"/>
+    <p:notesMasterId r:id="rId11"/>
   </p:notesMasterIdLst>
   <p:sldIdLst>
     <p:sldId id="256" r:id="rId2"/>
     <p:sldId id="257" r:id="rId3"/>
     <p:sldId id="258" r:id="rId4"/>
+    <p:sldId id="259" r:id="rId5"/>
+    <p:sldId id="260" r:id="rId6"/>
+    <p:sldId id="263" r:id="rId7"/>
+    <p:sldId id="264" r:id="rId8"/>
+    <p:sldId id="261" r:id="rId9"/>
+    <p:sldId id="262" r:id="rId10"/>
   </p:sldIdLst>
   <p:sldSz cx="12192000" cy="6858000"/>
   <p:notesSz cx="6858000" cy="9144000"/>
@@ -541,6 +547,90 @@
     <p:extLst>
       <p:ext uri="{BB962C8B-B14F-4D97-AF65-F5344CB8AC3E}">
         <p14:creationId xmlns:p14="http://schemas.microsoft.com/office/powerpoint/2010/main" val="3460404069"/>
+      </p:ext>
+    </p:extLst>
+  </p:cSld>
+  <p:clrMapOvr>
+    <a:masterClrMapping/>
+  </p:clrMapOvr>
+</p:notes>
+</file>
+
+<file path=ppt/notesSlides/notesSlide2.xml><?xml version="1.0" encoding="utf-8"?>
+<p:notes xmlns:a="http://schemas.openxmlformats.org/drawingml/2006/main" xmlns:r="http://schemas.openxmlformats.org/officeDocument/2006/relationships" xmlns:p="http://schemas.openxmlformats.org/presentationml/2006/main">
+  <p:cSld>
+    <p:spTree>
+      <p:nvGrpSpPr>
+        <p:cNvPr id="1" name=""/>
+        <p:cNvGrpSpPr/>
+        <p:nvPr/>
+      </p:nvGrpSpPr>
+      <p:grpSpPr>
+        <a:xfrm>
+          <a:off x="0" y="0"/>
+          <a:ext cx="0" cy="0"/>
+          <a:chOff x="0" y="0"/>
+          <a:chExt cx="0" cy="0"/>
+        </a:xfrm>
+      </p:grpSpPr>
+      <p:sp>
+        <p:nvSpPr>
+          <p:cNvPr id="2" name="Slide Image Placeholder 1"/>
+          <p:cNvSpPr>
+            <a:spLocks noGrp="1" noRot="1" noChangeAspect="1"/>
+          </p:cNvSpPr>
+          <p:nvPr>
+            <p:ph type="sldImg"/>
+          </p:nvPr>
+        </p:nvSpPr>
+        <p:spPr/>
+      </p:sp>
+      <p:sp>
+        <p:nvSpPr>
+          <p:cNvPr id="3" name="Notes Placeholder 2"/>
+          <p:cNvSpPr>
+            <a:spLocks noGrp="1"/>
+          </p:cNvSpPr>
+          <p:nvPr>
+            <p:ph type="body" idx="1"/>
+          </p:nvPr>
+        </p:nvSpPr>
+        <p:spPr/>
+        <p:txBody>
+          <a:bodyPr/>
+          <a:lstStyle/>
+          <a:p>
+            <a:endParaRPr lang="en-US" dirty="0"/>
+          </a:p>
+        </p:txBody>
+      </p:sp>
+      <p:sp>
+        <p:nvSpPr>
+          <p:cNvPr id="4" name="Slide Number Placeholder 3"/>
+          <p:cNvSpPr>
+            <a:spLocks noGrp="1"/>
+          </p:cNvSpPr>
+          <p:nvPr>
+            <p:ph type="sldNum" sz="quarter" idx="5"/>
+          </p:nvPr>
+        </p:nvSpPr>
+        <p:spPr/>
+        <p:txBody>
+          <a:bodyPr/>
+          <a:lstStyle/>
+          <a:p>
+            <a:fld id="{A68C2032-B50B-46B6-A4C5-397E124DBCC7}" type="slidenum">
+              <a:rPr lang="en-US" smtClean="0"/>
+              <a:t>4</a:t>
+            </a:fld>
+            <a:endParaRPr lang="en-US"/>
+          </a:p>
+        </p:txBody>
+      </p:sp>
+    </p:spTree>
+    <p:extLst>
+      <p:ext uri="{BB962C8B-B14F-4D97-AF65-F5344CB8AC3E}">
+        <p14:creationId xmlns:p14="http://schemas.microsoft.com/office/powerpoint/2010/main" val="2905257146"/>
       </p:ext>
     </p:extLst>
   </p:cSld>
@@ -35075,7 +35165,7 @@
           <a:p>
             <a:r>
               <a:rPr lang="en-US" sz="1100" dirty="0"/>
-              <a:t> Client</a:t>
+              <a:t>  Client</a:t>
             </a:r>
           </a:p>
         </p:txBody>
@@ -36428,7 +36518,7 @@
           <a:p>
             <a:r>
               <a:rPr lang="en-US" sz="1100" dirty="0" err="1"/>
-              <a:t>IngestDataCleaner</a:t>
+              <a:t>FeatureCalculation</a:t>
             </a:r>
             <a:endParaRPr lang="en-US" sz="1100" dirty="0"/>
           </a:p>
@@ -36464,7 +36554,7 @@
           <a:p>
             <a:r>
               <a:rPr lang="en-US" sz="1100" dirty="0" err="1"/>
-              <a:t>IngestDataCleaner</a:t>
+              <a:t>FeatureCalculation</a:t>
             </a:r>
             <a:endParaRPr lang="en-US" sz="1100" dirty="0"/>
           </a:p>
@@ -37969,8 +38059,8 @@
         </p:nvSpPr>
         <p:spPr>
           <a:xfrm>
-            <a:off x="7063020" y="4006749"/>
-            <a:ext cx="1875935" cy="261610"/>
+            <a:off x="7209833" y="3821143"/>
+            <a:ext cx="1875935" cy="430887"/>
           </a:xfrm>
           <a:prstGeom prst="rect">
             <a:avLst/>
@@ -37989,7 +38079,7 @@
             </a:r>
             <a:r>
               <a:rPr lang="en-US" sz="1100" dirty="0" err="1"/>
-              <a:t>FileSizeOptimizationTrigge</a:t>
+              <a:t>FileSizeOptimizationTrigger</a:t>
             </a:r>
             <a:endParaRPr lang="en-US" sz="1100" dirty="0"/>
           </a:p>
@@ -38184,6 +38274,1403 @@
     <p:extLst>
       <p:ext uri="{BB962C8B-B14F-4D97-AF65-F5344CB8AC3E}">
         <p14:creationId xmlns:p14="http://schemas.microsoft.com/office/powerpoint/2010/main" val="768238167"/>
+      </p:ext>
+    </p:extLst>
+  </p:cSld>
+  <p:clrMapOvr>
+    <a:masterClrMapping/>
+  </p:clrMapOvr>
+</p:sld>
+</file>
+
+<file path=ppt/slides/slide4.xml><?xml version="1.0" encoding="utf-8"?>
+<p:sld xmlns:a="http://schemas.openxmlformats.org/drawingml/2006/main" xmlns:r="http://schemas.openxmlformats.org/officeDocument/2006/relationships" xmlns:p="http://schemas.openxmlformats.org/presentationml/2006/main">
+  <p:cSld>
+    <p:spTree>
+      <p:nvGrpSpPr>
+        <p:cNvPr id="1" name=""/>
+        <p:cNvGrpSpPr/>
+        <p:nvPr/>
+      </p:nvGrpSpPr>
+      <p:grpSpPr>
+        <a:xfrm>
+          <a:off x="0" y="0"/>
+          <a:ext cx="0" cy="0"/>
+          <a:chOff x="0" y="0"/>
+          <a:chExt cx="0" cy="0"/>
+        </a:xfrm>
+      </p:grpSpPr>
+      <p:sp>
+        <p:nvSpPr>
+          <p:cNvPr id="2" name="Title 1">
+            <a:extLst>
+              <a:ext uri="{FF2B5EF4-FFF2-40B4-BE49-F238E27FC236}">
+                <a16:creationId xmlns:a16="http://schemas.microsoft.com/office/drawing/2014/main" id="{7CA4686B-ED2F-8BAE-F5E7-AE20DF7FACC9}"/>
+              </a:ext>
+            </a:extLst>
+          </p:cNvPr>
+          <p:cNvSpPr>
+            <a:spLocks noGrp="1"/>
+          </p:cNvSpPr>
+          <p:nvPr>
+            <p:ph type="title"/>
+          </p:nvPr>
+        </p:nvSpPr>
+        <p:spPr/>
+        <p:txBody>
+          <a:bodyPr/>
+          <a:lstStyle/>
+          <a:p>
+            <a:r>
+              <a:rPr lang="en-US" dirty="0"/>
+              <a:t>Service Architecture</a:t>
+            </a:r>
+          </a:p>
+        </p:txBody>
+      </p:sp>
+      <p:sp>
+        <p:nvSpPr>
+          <p:cNvPr id="3" name="Content Placeholder 2">
+            <a:extLst>
+              <a:ext uri="{FF2B5EF4-FFF2-40B4-BE49-F238E27FC236}">
+                <a16:creationId xmlns:a16="http://schemas.microsoft.com/office/drawing/2014/main" id="{232F21C7-7E2B-F005-2FA8-BD7325EFC1FB}"/>
+              </a:ext>
+            </a:extLst>
+          </p:cNvPr>
+          <p:cNvSpPr>
+            <a:spLocks noGrp="1"/>
+          </p:cNvSpPr>
+          <p:nvPr>
+            <p:ph idx="1"/>
+          </p:nvPr>
+        </p:nvSpPr>
+        <p:spPr>
+          <a:xfrm>
+            <a:off x="753980" y="1876926"/>
+            <a:ext cx="10413892" cy="4432434"/>
+          </a:xfrm>
+        </p:spPr>
+        <p:txBody>
+          <a:bodyPr>
+            <a:normAutofit lnSpcReduction="10000"/>
+          </a:bodyPr>
+          <a:lstStyle/>
+          <a:p>
+            <a:r>
+              <a:rPr lang="en-US" b="1" dirty="0"/>
+              <a:t>1. Data Storage:</a:t>
+            </a:r>
+          </a:p>
+          <a:p>
+            <a:pPr lvl="1"/>
+            <a:r>
+              <a:rPr lang="en-US" b="1" dirty="0"/>
+              <a:t>Raw Bucket: </a:t>
+            </a:r>
+            <a:r>
+              <a:rPr lang="en-US" dirty="0"/>
+              <a:t>This is the primary place for untouched input data.</a:t>
+            </a:r>
+          </a:p>
+          <a:p>
+            <a:pPr lvl="1"/>
+            <a:r>
+              <a:rPr lang="en-US" b="1" dirty="0"/>
+              <a:t>Ingest Bucket: </a:t>
+            </a:r>
+            <a:r>
+              <a:rPr lang="en-US" dirty="0"/>
+              <a:t>Here, data is validated. Invalid data is directed to the </a:t>
+            </a:r>
+            <a:r>
+              <a:rPr lang="en-US" b="1" dirty="0"/>
+              <a:t>Quarantine Bucket</a:t>
+            </a:r>
+            <a:r>
+              <a:rPr lang="en-US" dirty="0"/>
+              <a:t> for further analysis.</a:t>
+            </a:r>
+          </a:p>
+          <a:p>
+            <a:pPr lvl="1"/>
+            <a:r>
+              <a:rPr lang="en-US" b="1" dirty="0"/>
+              <a:t>Distill Bucket: </a:t>
+            </a:r>
+            <a:r>
+              <a:rPr lang="en-US" dirty="0"/>
+              <a:t>Data from both sources is combined here to derive combined features, preparing for further refinement and analytical use.</a:t>
+            </a:r>
+          </a:p>
+          <a:p>
+            <a:pPr lvl="1"/>
+            <a:r>
+              <a:rPr lang="en-US" b="1" dirty="0"/>
+              <a:t>Refine Bucket: </a:t>
+            </a:r>
+            <a:r>
+              <a:rPr lang="en-US" dirty="0"/>
+              <a:t>Data is further processed to obtain specific features for machine learning.</a:t>
+            </a:r>
+          </a:p>
+          <a:p>
+            <a:pPr lvl="1"/>
+            <a:r>
+              <a:rPr lang="en-US" b="1" dirty="0"/>
+              <a:t>Score Sight Model Bucket: </a:t>
+            </a:r>
+            <a:r>
+              <a:rPr lang="en-US" dirty="0"/>
+              <a:t>Contains the trained machine learning models as the resulting prediction data after the Training Job.</a:t>
+            </a:r>
+          </a:p>
+          <a:p>
+            <a:pPr marL="128016" lvl="1" indent="0">
+              <a:buNone/>
+            </a:pPr>
+            <a:endParaRPr lang="en-US" dirty="0"/>
+          </a:p>
+          <a:p>
+            <a:pPr marL="128016" lvl="1" indent="0">
+              <a:buNone/>
+            </a:pPr>
+            <a:r>
+              <a:rPr lang="en-US" sz="2200" b="1" dirty="0"/>
+              <a:t>2. Data Processing:</a:t>
+            </a:r>
+          </a:p>
+          <a:p>
+            <a:pPr marL="128016" lvl="1" indent="0">
+              <a:buNone/>
+            </a:pPr>
+            <a:r>
+              <a:rPr lang="en-US" b="1" dirty="0"/>
+              <a:t>Lambda Triggers:</a:t>
+            </a:r>
+          </a:p>
+          <a:p>
+            <a:pPr lvl="1"/>
+            <a:r>
+              <a:rPr lang="en-US" b="1" dirty="0" err="1"/>
+              <a:t>DataIngestTrigger</a:t>
+            </a:r>
+            <a:r>
+              <a:rPr lang="en-US" b="1" dirty="0"/>
+              <a:t>: </a:t>
+            </a:r>
+            <a:r>
+              <a:rPr lang="en-US" dirty="0"/>
+              <a:t>Activates upon the appearance of new data in the Raw Bucket, initiating the Glue Job processes.</a:t>
+            </a:r>
+          </a:p>
+          <a:p>
+            <a:pPr lvl="1"/>
+            <a:r>
+              <a:rPr lang="en-US" sz="1800" b="1" dirty="0" err="1"/>
+              <a:t>FileSizeOptimizationTrigger</a:t>
+            </a:r>
+            <a:r>
+              <a:rPr lang="en-US" b="1" dirty="0"/>
+              <a:t>: </a:t>
+            </a:r>
+            <a:r>
+              <a:rPr lang="en-US" dirty="0"/>
+              <a:t>Activates during weekend to scan subfolders, detect subfolders with small files and repartition them into larger, more optimal ones.</a:t>
+            </a:r>
+            <a:endParaRPr lang="en-US" b="1" dirty="0"/>
+          </a:p>
+        </p:txBody>
+      </p:sp>
+    </p:spTree>
+    <p:extLst>
+      <p:ext uri="{BB962C8B-B14F-4D97-AF65-F5344CB8AC3E}">
+        <p14:creationId xmlns:p14="http://schemas.microsoft.com/office/powerpoint/2010/main" val="3588045888"/>
+      </p:ext>
+    </p:extLst>
+  </p:cSld>
+  <p:clrMapOvr>
+    <a:masterClrMapping/>
+  </p:clrMapOvr>
+</p:sld>
+</file>
+
+<file path=ppt/slides/slide5.xml><?xml version="1.0" encoding="utf-8"?>
+<p:sld xmlns:a="http://schemas.openxmlformats.org/drawingml/2006/main" xmlns:r="http://schemas.openxmlformats.org/officeDocument/2006/relationships" xmlns:p="http://schemas.openxmlformats.org/presentationml/2006/main">
+  <p:cSld>
+    <p:spTree>
+      <p:nvGrpSpPr>
+        <p:cNvPr id="1" name=""/>
+        <p:cNvGrpSpPr/>
+        <p:nvPr/>
+      </p:nvGrpSpPr>
+      <p:grpSpPr>
+        <a:xfrm>
+          <a:off x="0" y="0"/>
+          <a:ext cx="0" cy="0"/>
+          <a:chOff x="0" y="0"/>
+          <a:chExt cx="0" cy="0"/>
+        </a:xfrm>
+      </p:grpSpPr>
+      <p:sp>
+        <p:nvSpPr>
+          <p:cNvPr id="2" name="Title 1">
+            <a:extLst>
+              <a:ext uri="{FF2B5EF4-FFF2-40B4-BE49-F238E27FC236}">
+                <a16:creationId xmlns:a16="http://schemas.microsoft.com/office/drawing/2014/main" id="{57B45316-6E40-29F3-5E2C-79CFBEA5A92A}"/>
+              </a:ext>
+            </a:extLst>
+          </p:cNvPr>
+          <p:cNvSpPr>
+            <a:spLocks noGrp="1"/>
+          </p:cNvSpPr>
+          <p:nvPr>
+            <p:ph type="title"/>
+          </p:nvPr>
+        </p:nvSpPr>
+        <p:spPr/>
+        <p:txBody>
+          <a:bodyPr/>
+          <a:lstStyle/>
+          <a:p>
+            <a:r>
+              <a:rPr lang="en-US" dirty="0"/>
+              <a:t>Service Architecture</a:t>
+            </a:r>
+          </a:p>
+        </p:txBody>
+      </p:sp>
+      <p:sp>
+        <p:nvSpPr>
+          <p:cNvPr id="3" name="Content Placeholder 2">
+            <a:extLst>
+              <a:ext uri="{FF2B5EF4-FFF2-40B4-BE49-F238E27FC236}">
+                <a16:creationId xmlns:a16="http://schemas.microsoft.com/office/drawing/2014/main" id="{4B8B7615-F236-314A-AD46-1684C66A8F03}"/>
+              </a:ext>
+            </a:extLst>
+          </p:cNvPr>
+          <p:cNvSpPr>
+            <a:spLocks noGrp="1"/>
+          </p:cNvSpPr>
+          <p:nvPr>
+            <p:ph idx="1"/>
+          </p:nvPr>
+        </p:nvSpPr>
+        <p:spPr>
+          <a:xfrm>
+            <a:off x="718458" y="1970314"/>
+            <a:ext cx="10025744" cy="4339046"/>
+          </a:xfrm>
+        </p:spPr>
+        <p:txBody>
+          <a:bodyPr>
+            <a:normAutofit/>
+          </a:bodyPr>
+          <a:lstStyle/>
+          <a:p>
+            <a:r>
+              <a:rPr lang="en-US" sz="1800" b="1" dirty="0"/>
+              <a:t>Glue Jobs: </a:t>
+            </a:r>
+            <a:r>
+              <a:rPr lang="en-US" sz="1800" dirty="0"/>
+              <a:t>Utilize </a:t>
+            </a:r>
+            <a:r>
+              <a:rPr lang="en-US" sz="1800" dirty="0" err="1"/>
+              <a:t>pyspark</a:t>
+            </a:r>
+            <a:r>
+              <a:rPr lang="en-US" sz="1800" dirty="0"/>
+              <a:t> scripts to process data between different buckets and combine features.</a:t>
+            </a:r>
+          </a:p>
+          <a:p>
+            <a:pPr marL="0" indent="0">
+              <a:buNone/>
+            </a:pPr>
+            <a:r>
+              <a:rPr lang="en-US" sz="1800" b="1" dirty="0"/>
+              <a:t>1) </a:t>
+            </a:r>
+            <a:r>
+              <a:rPr lang="en-US" sz="1800" b="1" dirty="0" err="1"/>
+              <a:t>RawDataProcessing</a:t>
+            </a:r>
+            <a:r>
+              <a:rPr lang="en-US" sz="1800" b="1" dirty="0"/>
+              <a:t>:</a:t>
+            </a:r>
+          </a:p>
+          <a:p>
+            <a:pPr lvl="1">
+              <a:buFont typeface="Wingdings" panose="05000000000000000000" pitchFamily="2" charset="2"/>
+              <a:buChar char="§"/>
+            </a:pPr>
+            <a:r>
+              <a:rPr lang="en-US" b="1" dirty="0"/>
+              <a:t>Functionality</a:t>
+            </a:r>
+            <a:r>
+              <a:rPr lang="en-US" sz="2100" b="1" dirty="0"/>
+              <a:t>:</a:t>
+            </a:r>
+          </a:p>
+          <a:p>
+            <a:pPr lvl="2">
+              <a:buFont typeface="Wingdings" panose="05000000000000000000" pitchFamily="2" charset="2"/>
+              <a:buChar char="§"/>
+            </a:pPr>
+            <a:r>
+              <a:rPr lang="en-US" sz="1700" dirty="0"/>
+              <a:t>Data validation to ensure consistency and correctness.</a:t>
+            </a:r>
+          </a:p>
+          <a:p>
+            <a:pPr lvl="2">
+              <a:buFont typeface="Wingdings" panose="05000000000000000000" pitchFamily="2" charset="2"/>
+              <a:buChar char="§"/>
+            </a:pPr>
+            <a:r>
+              <a:rPr lang="en-US" sz="1700" dirty="0"/>
+              <a:t>Schema validation to check for appropriate data structures.</a:t>
+            </a:r>
+          </a:p>
+          <a:p>
+            <a:pPr lvl="2">
+              <a:buFont typeface="Wingdings" panose="05000000000000000000" pitchFamily="2" charset="2"/>
+              <a:buChar char="§"/>
+            </a:pPr>
+            <a:r>
+              <a:rPr lang="en-US" sz="1700" dirty="0"/>
+              <a:t>Data cleaning to remove any anomalies or incorrect entries.</a:t>
+            </a:r>
+          </a:p>
+          <a:p>
+            <a:pPr marL="0" indent="0">
+              <a:buNone/>
+            </a:pPr>
+            <a:r>
+              <a:rPr lang="en-US" sz="1800" dirty="0"/>
+              <a:t>2) </a:t>
+            </a:r>
+            <a:r>
+              <a:rPr lang="en-US" sz="1800" b="1" dirty="0" err="1"/>
+              <a:t>FeatureCalculation</a:t>
+            </a:r>
+            <a:r>
+              <a:rPr lang="en-US" sz="1800" b="1" dirty="0"/>
+              <a:t>:</a:t>
+            </a:r>
+          </a:p>
+          <a:p>
+            <a:pPr lvl="1">
+              <a:buFont typeface="Wingdings" panose="05000000000000000000" pitchFamily="2" charset="2"/>
+              <a:buChar char="§"/>
+            </a:pPr>
+            <a:r>
+              <a:rPr lang="en-US" b="1" dirty="0"/>
+              <a:t>Functionality:</a:t>
+            </a:r>
+          </a:p>
+          <a:p>
+            <a:pPr lvl="2">
+              <a:buFont typeface="Wingdings" panose="05000000000000000000" pitchFamily="2" charset="2"/>
+              <a:buChar char="§"/>
+            </a:pPr>
+            <a:r>
+              <a:rPr lang="en-US" sz="1800" b="1" dirty="0"/>
+              <a:t>Monthly</a:t>
+            </a:r>
+            <a:r>
+              <a:rPr lang="en-US" b="1" dirty="0"/>
+              <a:t> </a:t>
+            </a:r>
+            <a:r>
+              <a:rPr lang="en-US" sz="1800" b="1" dirty="0"/>
+              <a:t>Feature Script:</a:t>
+            </a:r>
+          </a:p>
+          <a:p>
+            <a:pPr lvl="3">
+              <a:buFont typeface="Wingdings" panose="05000000000000000000" pitchFamily="2" charset="2"/>
+              <a:buChar char="§"/>
+            </a:pPr>
+            <a:r>
+              <a:rPr lang="en-US" sz="1800" b="1" dirty="0"/>
+              <a:t>Input: </a:t>
+            </a:r>
+            <a:r>
+              <a:rPr lang="en-US" sz="1800" dirty="0"/>
+              <a:t>A table (</a:t>
+            </a:r>
+            <a:r>
+              <a:rPr lang="en-US" sz="1800" b="1" dirty="0" err="1"/>
+              <a:t>source_m</a:t>
+            </a:r>
+            <a:r>
+              <a:rPr lang="en-US" sz="1800" dirty="0"/>
+              <a:t>) with monthly snapshots.</a:t>
+            </a:r>
+          </a:p>
+          <a:p>
+            <a:pPr lvl="3">
+              <a:buFont typeface="Wingdings" panose="05000000000000000000" pitchFamily="2" charset="2"/>
+              <a:buChar char="§"/>
+            </a:pPr>
+            <a:r>
+              <a:rPr lang="en-US" sz="1800" b="1" dirty="0"/>
+              <a:t>Key Components: </a:t>
+            </a:r>
+            <a:r>
+              <a:rPr lang="en-US" sz="1800" b="1" dirty="0" err="1"/>
+              <a:t>person_id</a:t>
+            </a:r>
+            <a:r>
+              <a:rPr lang="en-US" sz="1800" b="1" dirty="0"/>
+              <a:t> </a:t>
+            </a:r>
+            <a:r>
+              <a:rPr lang="en-US" sz="1800" dirty="0"/>
+              <a:t>(int), </a:t>
+            </a:r>
+            <a:r>
+              <a:rPr lang="en-US" sz="1800" b="1" dirty="0" err="1"/>
+              <a:t>snap_month_dt</a:t>
+            </a:r>
+            <a:r>
+              <a:rPr lang="en-US" sz="1800" b="1" dirty="0"/>
+              <a:t> </a:t>
+            </a:r>
+            <a:r>
+              <a:rPr lang="en-US" sz="1800" dirty="0"/>
+              <a:t>(date - the first day of the month), and other columns.</a:t>
+            </a:r>
+          </a:p>
+          <a:p>
+            <a:pPr lvl="3">
+              <a:buFont typeface="Wingdings" panose="05000000000000000000" pitchFamily="2" charset="2"/>
+              <a:buChar char="§"/>
+            </a:pPr>
+            <a:r>
+              <a:rPr lang="en-US" sz="1800" b="1" dirty="0"/>
+              <a:t>Output: </a:t>
+            </a:r>
+            <a:r>
+              <a:rPr lang="en-US" sz="1800" dirty="0"/>
+              <a:t>Table with columns: </a:t>
+            </a:r>
+            <a:r>
+              <a:rPr lang="en-US" sz="1800" b="1" dirty="0" err="1"/>
+              <a:t>person_id</a:t>
+            </a:r>
+            <a:r>
+              <a:rPr lang="en-US" sz="1800" b="1" dirty="0"/>
+              <a:t>, </a:t>
+            </a:r>
+            <a:r>
+              <a:rPr lang="en-US" sz="1800" b="1" dirty="0" err="1"/>
+              <a:t>snap_month_dt</a:t>
+            </a:r>
+            <a:r>
+              <a:rPr lang="en-US" sz="1800" b="1" dirty="0"/>
+              <a:t>, feature1, feature2, feature3.</a:t>
+            </a:r>
+          </a:p>
+        </p:txBody>
+      </p:sp>
+    </p:spTree>
+    <p:extLst>
+      <p:ext uri="{BB962C8B-B14F-4D97-AF65-F5344CB8AC3E}">
+        <p14:creationId xmlns:p14="http://schemas.microsoft.com/office/powerpoint/2010/main" val="3844885756"/>
+      </p:ext>
+    </p:extLst>
+  </p:cSld>
+  <p:clrMapOvr>
+    <a:masterClrMapping/>
+  </p:clrMapOvr>
+</p:sld>
+</file>
+
+<file path=ppt/slides/slide6.xml><?xml version="1.0" encoding="utf-8"?>
+<p:sld xmlns:a="http://schemas.openxmlformats.org/drawingml/2006/main" xmlns:r="http://schemas.openxmlformats.org/officeDocument/2006/relationships" xmlns:p="http://schemas.openxmlformats.org/presentationml/2006/main">
+  <p:cSld>
+    <p:spTree>
+      <p:nvGrpSpPr>
+        <p:cNvPr id="1" name=""/>
+        <p:cNvGrpSpPr/>
+        <p:nvPr/>
+      </p:nvGrpSpPr>
+      <p:grpSpPr>
+        <a:xfrm>
+          <a:off x="0" y="0"/>
+          <a:ext cx="0" cy="0"/>
+          <a:chOff x="0" y="0"/>
+          <a:chExt cx="0" cy="0"/>
+        </a:xfrm>
+      </p:grpSpPr>
+      <p:sp>
+        <p:nvSpPr>
+          <p:cNvPr id="2" name="Title 1">
+            <a:extLst>
+              <a:ext uri="{FF2B5EF4-FFF2-40B4-BE49-F238E27FC236}">
+                <a16:creationId xmlns:a16="http://schemas.microsoft.com/office/drawing/2014/main" id="{9E1519C2-E18D-AF21-6569-08C0E7A5726B}"/>
+              </a:ext>
+            </a:extLst>
+          </p:cNvPr>
+          <p:cNvSpPr>
+            <a:spLocks noGrp="1"/>
+          </p:cNvSpPr>
+          <p:nvPr>
+            <p:ph type="title"/>
+          </p:nvPr>
+        </p:nvSpPr>
+        <p:spPr/>
+        <p:txBody>
+          <a:bodyPr/>
+          <a:lstStyle/>
+          <a:p>
+            <a:r>
+              <a:rPr lang="en-US" dirty="0"/>
+              <a:t>Service Architecture</a:t>
+            </a:r>
+          </a:p>
+        </p:txBody>
+      </p:sp>
+      <p:sp>
+        <p:nvSpPr>
+          <p:cNvPr id="3" name="Content Placeholder 2">
+            <a:extLst>
+              <a:ext uri="{FF2B5EF4-FFF2-40B4-BE49-F238E27FC236}">
+                <a16:creationId xmlns:a16="http://schemas.microsoft.com/office/drawing/2014/main" id="{CD3D7B85-28D0-F897-A7B8-7D631C1688A3}"/>
+              </a:ext>
+            </a:extLst>
+          </p:cNvPr>
+          <p:cNvSpPr>
+            <a:spLocks noGrp="1"/>
+          </p:cNvSpPr>
+          <p:nvPr>
+            <p:ph idx="1"/>
+          </p:nvPr>
+        </p:nvSpPr>
+        <p:spPr>
+          <a:xfrm>
+            <a:off x="881744" y="1948543"/>
+            <a:ext cx="9862458" cy="4360817"/>
+          </a:xfrm>
+        </p:spPr>
+        <p:txBody>
+          <a:bodyPr/>
+          <a:lstStyle/>
+          <a:p>
+            <a:pPr lvl="4">
+              <a:buFont typeface="Wingdings" panose="05000000000000000000" pitchFamily="2" charset="2"/>
+              <a:buChar char="§"/>
+            </a:pPr>
+            <a:r>
+              <a:rPr lang="en-US" sz="1800" b="1" dirty="0"/>
+              <a:t>Daily</a:t>
+            </a:r>
+            <a:r>
+              <a:rPr lang="en-US" b="1" dirty="0"/>
+              <a:t> </a:t>
+            </a:r>
+            <a:r>
+              <a:rPr lang="en-US" sz="1800" b="1" dirty="0"/>
+              <a:t>Feature Script:</a:t>
+            </a:r>
+          </a:p>
+          <a:p>
+            <a:pPr lvl="5">
+              <a:buFont typeface="Wingdings" panose="05000000000000000000" pitchFamily="2" charset="2"/>
+              <a:buChar char="§"/>
+            </a:pPr>
+            <a:r>
+              <a:rPr lang="en-US" sz="1800" b="1" dirty="0"/>
+              <a:t>Input: </a:t>
+            </a:r>
+            <a:r>
+              <a:rPr lang="en-US" sz="1800" dirty="0"/>
+              <a:t>A table (</a:t>
+            </a:r>
+            <a:r>
+              <a:rPr lang="en-US" sz="1800" b="1" dirty="0" err="1"/>
+              <a:t>source_d</a:t>
+            </a:r>
+            <a:r>
+              <a:rPr lang="en-US" sz="1800" dirty="0"/>
+              <a:t>) with monthly snapshots.</a:t>
+            </a:r>
+          </a:p>
+          <a:p>
+            <a:pPr lvl="5">
+              <a:buFont typeface="Wingdings" panose="05000000000000000000" pitchFamily="2" charset="2"/>
+              <a:buChar char="§"/>
+            </a:pPr>
+            <a:r>
+              <a:rPr lang="en-US" sz="1800" b="1" dirty="0"/>
+              <a:t>Key Components: </a:t>
+            </a:r>
+            <a:r>
+              <a:rPr lang="en-US" sz="1800" b="1" dirty="0" err="1"/>
+              <a:t>person_id</a:t>
+            </a:r>
+            <a:r>
+              <a:rPr lang="en-US" sz="1800" b="1" dirty="0"/>
+              <a:t> </a:t>
+            </a:r>
+            <a:r>
+              <a:rPr lang="en-US" sz="1800" dirty="0"/>
+              <a:t>(int), </a:t>
+            </a:r>
+            <a:r>
+              <a:rPr lang="en-US" sz="1800" b="1" dirty="0" err="1"/>
+              <a:t>snap_day_dt</a:t>
+            </a:r>
+            <a:r>
+              <a:rPr lang="en-US" sz="1800" b="1" dirty="0"/>
+              <a:t> </a:t>
+            </a:r>
+            <a:r>
+              <a:rPr lang="en-US" sz="1800" dirty="0"/>
+              <a:t>(date - the first day of the month), and other columns.</a:t>
+            </a:r>
+          </a:p>
+          <a:p>
+            <a:pPr lvl="5">
+              <a:buFont typeface="Wingdings" panose="05000000000000000000" pitchFamily="2" charset="2"/>
+              <a:buChar char="§"/>
+            </a:pPr>
+            <a:r>
+              <a:rPr lang="en-US" sz="1800" b="1" dirty="0"/>
+              <a:t>Output: </a:t>
+            </a:r>
+            <a:r>
+              <a:rPr lang="en-US" sz="1800" dirty="0"/>
+              <a:t>Table with columns: </a:t>
+            </a:r>
+            <a:r>
+              <a:rPr lang="en-US" sz="1800" b="1" dirty="0" err="1"/>
+              <a:t>person_id</a:t>
+            </a:r>
+            <a:r>
+              <a:rPr lang="en-US" sz="1800" b="1" dirty="0"/>
+              <a:t>, </a:t>
+            </a:r>
+            <a:r>
+              <a:rPr lang="en-US" sz="1800" b="1" dirty="0" err="1"/>
+              <a:t>snap_day_dt</a:t>
+            </a:r>
+            <a:r>
+              <a:rPr lang="en-US" sz="1800" b="1" dirty="0"/>
+              <a:t>, feature4, feature5.</a:t>
+            </a:r>
+          </a:p>
+          <a:p>
+            <a:pPr marL="457200" lvl="3" indent="0">
+              <a:buNone/>
+            </a:pPr>
+            <a:endParaRPr lang="en-US" sz="1800" b="1" dirty="0"/>
+          </a:p>
+          <a:p>
+            <a:r>
+              <a:rPr lang="en-US" sz="1800" b="1" dirty="0"/>
+              <a:t>3) </a:t>
+            </a:r>
+            <a:r>
+              <a:rPr lang="en-US" sz="1800" b="1" dirty="0" err="1"/>
+              <a:t>DistilledDataAggregator</a:t>
+            </a:r>
+            <a:r>
+              <a:rPr lang="en-US" sz="1800" b="1" dirty="0"/>
+              <a:t>:</a:t>
+            </a:r>
+          </a:p>
+          <a:p>
+            <a:pPr lvl="2">
+              <a:buFont typeface="Wingdings" panose="05000000000000000000" pitchFamily="2" charset="2"/>
+              <a:buChar char="§"/>
+            </a:pPr>
+            <a:r>
+              <a:rPr lang="en-US" sz="1800" b="1" dirty="0"/>
+              <a:t>Functionality:</a:t>
+            </a:r>
+          </a:p>
+          <a:p>
+            <a:pPr lvl="3">
+              <a:buFont typeface="Wingdings" panose="05000000000000000000" pitchFamily="2" charset="2"/>
+              <a:buChar char="§"/>
+            </a:pPr>
+            <a:r>
+              <a:rPr lang="en-US" sz="1800" dirty="0"/>
+              <a:t>Aggregate and prepare the features into a format suitable for ML model consumption.</a:t>
+            </a:r>
+          </a:p>
+          <a:p>
+            <a:pPr lvl="3">
+              <a:buFont typeface="Wingdings" panose="05000000000000000000" pitchFamily="2" charset="2"/>
+              <a:buChar char="§"/>
+            </a:pPr>
+            <a:r>
+              <a:rPr lang="en-US" sz="1800" b="1" dirty="0"/>
+              <a:t> Output: </a:t>
+            </a:r>
+            <a:r>
+              <a:rPr lang="en-US" sz="1800" dirty="0"/>
+              <a:t>Combined data with </a:t>
+            </a:r>
+            <a:r>
+              <a:rPr lang="en-US" sz="1800" b="1" dirty="0"/>
+              <a:t>feature1, feature2, feature3, feature4, feature5.</a:t>
+            </a:r>
+          </a:p>
+          <a:p>
+            <a:pPr marL="457200" lvl="3" indent="0">
+              <a:buNone/>
+            </a:pPr>
+            <a:endParaRPr lang="en-US" b="1" dirty="0"/>
+          </a:p>
+        </p:txBody>
+      </p:sp>
+    </p:spTree>
+    <p:extLst>
+      <p:ext uri="{BB962C8B-B14F-4D97-AF65-F5344CB8AC3E}">
+        <p14:creationId xmlns:p14="http://schemas.microsoft.com/office/powerpoint/2010/main" val="1536819626"/>
+      </p:ext>
+    </p:extLst>
+  </p:cSld>
+  <p:clrMapOvr>
+    <a:masterClrMapping/>
+  </p:clrMapOvr>
+</p:sld>
+</file>
+
+<file path=ppt/slides/slide7.xml><?xml version="1.0" encoding="utf-8"?>
+<p:sld xmlns:a="http://schemas.openxmlformats.org/drawingml/2006/main" xmlns:r="http://schemas.openxmlformats.org/officeDocument/2006/relationships" xmlns:p="http://schemas.openxmlformats.org/presentationml/2006/main">
+  <p:cSld>
+    <p:spTree>
+      <p:nvGrpSpPr>
+        <p:cNvPr id="1" name=""/>
+        <p:cNvGrpSpPr/>
+        <p:nvPr/>
+      </p:nvGrpSpPr>
+      <p:grpSpPr>
+        <a:xfrm>
+          <a:off x="0" y="0"/>
+          <a:ext cx="0" cy="0"/>
+          <a:chOff x="0" y="0"/>
+          <a:chExt cx="0" cy="0"/>
+        </a:xfrm>
+      </p:grpSpPr>
+      <p:sp>
+        <p:nvSpPr>
+          <p:cNvPr id="2" name="Title 1">
+            <a:extLst>
+              <a:ext uri="{FF2B5EF4-FFF2-40B4-BE49-F238E27FC236}">
+                <a16:creationId xmlns:a16="http://schemas.microsoft.com/office/drawing/2014/main" id="{A8B64F0B-3412-7597-3F0F-80C26F05EAD2}"/>
+              </a:ext>
+            </a:extLst>
+          </p:cNvPr>
+          <p:cNvSpPr>
+            <a:spLocks noGrp="1"/>
+          </p:cNvSpPr>
+          <p:nvPr>
+            <p:ph type="title"/>
+          </p:nvPr>
+        </p:nvSpPr>
+        <p:spPr/>
+        <p:txBody>
+          <a:bodyPr/>
+          <a:lstStyle/>
+          <a:p>
+            <a:r>
+              <a:rPr lang="en-US" dirty="0"/>
+              <a:t>Service Architecture</a:t>
+            </a:r>
+          </a:p>
+        </p:txBody>
+      </p:sp>
+      <p:sp>
+        <p:nvSpPr>
+          <p:cNvPr id="3" name="Content Placeholder 2">
+            <a:extLst>
+              <a:ext uri="{FF2B5EF4-FFF2-40B4-BE49-F238E27FC236}">
+                <a16:creationId xmlns:a16="http://schemas.microsoft.com/office/drawing/2014/main" id="{A36E4B27-39DE-D06F-3983-28B83B5B12F7}"/>
+              </a:ext>
+            </a:extLst>
+          </p:cNvPr>
+          <p:cNvSpPr>
+            <a:spLocks noGrp="1"/>
+          </p:cNvSpPr>
+          <p:nvPr>
+            <p:ph idx="1"/>
+          </p:nvPr>
+        </p:nvSpPr>
+        <p:spPr>
+          <a:xfrm>
+            <a:off x="718458" y="1948543"/>
+            <a:ext cx="10025744" cy="4360817"/>
+          </a:xfrm>
+        </p:spPr>
+        <p:txBody>
+          <a:bodyPr/>
+          <a:lstStyle/>
+          <a:p>
+            <a:r>
+              <a:rPr lang="en-US" sz="1800" b="1" dirty="0"/>
+              <a:t>4) </a:t>
+            </a:r>
+            <a:r>
+              <a:rPr lang="en-US" sz="1800" b="1" dirty="0" err="1"/>
+              <a:t>FileSizeOptimizationJob</a:t>
+            </a:r>
+            <a:r>
+              <a:rPr lang="en-US" sz="1800" b="1" dirty="0"/>
+              <a:t>:</a:t>
+            </a:r>
+          </a:p>
+          <a:p>
+            <a:pPr lvl="2">
+              <a:buFont typeface="Wingdings" panose="05000000000000000000" pitchFamily="2" charset="2"/>
+              <a:buChar char="§"/>
+            </a:pPr>
+            <a:r>
+              <a:rPr lang="en-US" sz="1800" b="1" dirty="0"/>
+              <a:t>Functionality:</a:t>
+            </a:r>
+          </a:p>
+          <a:p>
+            <a:pPr lvl="3">
+              <a:buFont typeface="Wingdings" panose="05000000000000000000" pitchFamily="2" charset="2"/>
+              <a:buChar char="§"/>
+            </a:pPr>
+            <a:r>
+              <a:rPr lang="en-US" sz="1800" b="1" dirty="0"/>
+              <a:t>Bucket Scanning: </a:t>
+            </a:r>
+            <a:r>
+              <a:rPr lang="en-US" sz="1800" dirty="0"/>
+              <a:t>Scan specified S3 buckets or paths for the presence of multiple small files.</a:t>
+            </a:r>
+          </a:p>
+          <a:p>
+            <a:pPr lvl="3">
+              <a:buFont typeface="Wingdings" panose="05000000000000000000" pitchFamily="2" charset="2"/>
+              <a:buChar char="§"/>
+            </a:pPr>
+            <a:r>
+              <a:rPr lang="en-US" sz="1800" b="1" dirty="0"/>
+              <a:t>Detection: </a:t>
+            </a:r>
+            <a:r>
+              <a:rPr lang="en-US" sz="1800" dirty="0"/>
+              <a:t>Identify folders that have many small files that together could be optimized into larger files.</a:t>
+            </a:r>
+          </a:p>
+          <a:p>
+            <a:pPr lvl="3">
+              <a:buFont typeface="Wingdings" panose="05000000000000000000" pitchFamily="2" charset="2"/>
+              <a:buChar char="§"/>
+            </a:pPr>
+            <a:r>
+              <a:rPr lang="en-US" sz="1800" b="1" dirty="0"/>
+              <a:t>Repartition: </a:t>
+            </a:r>
+            <a:r>
+              <a:rPr lang="en-US" sz="1800" dirty="0"/>
+              <a:t>Use Spark's repartitioning functionality to consolidate multiple small files into fewer larger files.</a:t>
+            </a:r>
+          </a:p>
+          <a:p>
+            <a:pPr lvl="3">
+              <a:buFont typeface="Wingdings" panose="05000000000000000000" pitchFamily="2" charset="2"/>
+              <a:buChar char="§"/>
+            </a:pPr>
+            <a:r>
+              <a:rPr lang="en-US" sz="1800" b="1" dirty="0"/>
+              <a:t>Overwrite: </a:t>
+            </a:r>
+            <a:r>
+              <a:rPr lang="en-US" sz="1800" dirty="0"/>
+              <a:t>Replace the many small files in the original S3 location with the fewer optimized larger files.</a:t>
+            </a:r>
+            <a:endParaRPr lang="en-US" sz="1800" b="1" dirty="0"/>
+          </a:p>
+          <a:p>
+            <a:endParaRPr lang="en-US" dirty="0"/>
+          </a:p>
+        </p:txBody>
+      </p:sp>
+    </p:spTree>
+    <p:extLst>
+      <p:ext uri="{BB962C8B-B14F-4D97-AF65-F5344CB8AC3E}">
+        <p14:creationId xmlns:p14="http://schemas.microsoft.com/office/powerpoint/2010/main" val="4284423295"/>
+      </p:ext>
+    </p:extLst>
+  </p:cSld>
+  <p:clrMapOvr>
+    <a:masterClrMapping/>
+  </p:clrMapOvr>
+</p:sld>
+</file>
+
+<file path=ppt/slides/slide8.xml><?xml version="1.0" encoding="utf-8"?>
+<p:sld xmlns:a="http://schemas.openxmlformats.org/drawingml/2006/main" xmlns:r="http://schemas.openxmlformats.org/officeDocument/2006/relationships" xmlns:p="http://schemas.openxmlformats.org/presentationml/2006/main">
+  <p:cSld>
+    <p:spTree>
+      <p:nvGrpSpPr>
+        <p:cNvPr id="1" name=""/>
+        <p:cNvGrpSpPr/>
+        <p:nvPr/>
+      </p:nvGrpSpPr>
+      <p:grpSpPr>
+        <a:xfrm>
+          <a:off x="0" y="0"/>
+          <a:ext cx="0" cy="0"/>
+          <a:chOff x="0" y="0"/>
+          <a:chExt cx="0" cy="0"/>
+        </a:xfrm>
+      </p:grpSpPr>
+      <p:sp>
+        <p:nvSpPr>
+          <p:cNvPr id="2" name="Title 1">
+            <a:extLst>
+              <a:ext uri="{FF2B5EF4-FFF2-40B4-BE49-F238E27FC236}">
+                <a16:creationId xmlns:a16="http://schemas.microsoft.com/office/drawing/2014/main" id="{BE85E96A-497D-0EC8-BA2C-D6AE4C6FC5C7}"/>
+              </a:ext>
+            </a:extLst>
+          </p:cNvPr>
+          <p:cNvSpPr>
+            <a:spLocks noGrp="1"/>
+          </p:cNvSpPr>
+          <p:nvPr>
+            <p:ph type="title"/>
+          </p:nvPr>
+        </p:nvSpPr>
+        <p:spPr/>
+        <p:txBody>
+          <a:bodyPr/>
+          <a:lstStyle/>
+          <a:p>
+            <a:r>
+              <a:rPr lang="en-US" dirty="0"/>
+              <a:t>Service Architecture</a:t>
+            </a:r>
+          </a:p>
+        </p:txBody>
+      </p:sp>
+      <p:sp>
+        <p:nvSpPr>
+          <p:cNvPr id="3" name="Content Placeholder 2">
+            <a:extLst>
+              <a:ext uri="{FF2B5EF4-FFF2-40B4-BE49-F238E27FC236}">
+                <a16:creationId xmlns:a16="http://schemas.microsoft.com/office/drawing/2014/main" id="{C6F838DD-0286-20A3-C0AB-2D57D8CF62B0}"/>
+              </a:ext>
+            </a:extLst>
+          </p:cNvPr>
+          <p:cNvSpPr>
+            <a:spLocks noGrp="1"/>
+          </p:cNvSpPr>
+          <p:nvPr>
+            <p:ph idx="1"/>
+          </p:nvPr>
+        </p:nvSpPr>
+        <p:spPr>
+          <a:xfrm>
+            <a:off x="729343" y="1632857"/>
+            <a:ext cx="9797143" cy="4735285"/>
+          </a:xfrm>
+        </p:spPr>
+        <p:txBody>
+          <a:bodyPr>
+            <a:normAutofit fontScale="92500" lnSpcReduction="10000"/>
+          </a:bodyPr>
+          <a:lstStyle/>
+          <a:p>
+            <a:pPr lvl="1"/>
+            <a:endParaRPr lang="en-US" b="1" dirty="0"/>
+          </a:p>
+          <a:p>
+            <a:r>
+              <a:rPr lang="en-US" sz="2400" b="1" dirty="0"/>
+              <a:t>3. Machine Learning Model:</a:t>
+            </a:r>
+          </a:p>
+          <a:p>
+            <a:pPr lvl="1"/>
+            <a:r>
+              <a:rPr lang="en-US" b="1" dirty="0" err="1"/>
+              <a:t>SageMaker</a:t>
+            </a:r>
+            <a:r>
+              <a:rPr lang="en-US" b="1" dirty="0"/>
+              <a:t> Training Job: </a:t>
+            </a:r>
+            <a:r>
+              <a:rPr lang="en-US" dirty="0"/>
+              <a:t>Uses data from the Refine Bucket to train the ML model.</a:t>
+            </a:r>
+            <a:endParaRPr lang="en-US" b="1" dirty="0"/>
+          </a:p>
+          <a:p>
+            <a:pPr marL="128016" lvl="1" indent="0">
+              <a:buNone/>
+            </a:pPr>
+            <a:endParaRPr lang="en-US" sz="2200" b="1" dirty="0"/>
+          </a:p>
+          <a:p>
+            <a:pPr marL="128016" lvl="1" indent="0">
+              <a:buNone/>
+            </a:pPr>
+            <a:r>
+              <a:rPr lang="en-US" sz="2200" b="1" dirty="0"/>
+              <a:t>4. </a:t>
+            </a:r>
+            <a:r>
+              <a:rPr lang="en-US" sz="2400" b="1" dirty="0"/>
+              <a:t>Prediction Services:</a:t>
+            </a:r>
+          </a:p>
+          <a:p>
+            <a:pPr lvl="1"/>
+            <a:r>
+              <a:rPr lang="en-US" b="1" dirty="0"/>
+              <a:t>Online Prediction: </a:t>
+            </a:r>
+            <a:r>
+              <a:rPr lang="en-US" dirty="0" err="1"/>
+              <a:t>SageMaker</a:t>
+            </a:r>
+            <a:r>
+              <a:rPr lang="en-US" dirty="0"/>
+              <a:t> Endpoint handles real-time prediction. A Lambda function (</a:t>
+            </a:r>
+            <a:r>
+              <a:rPr lang="en-US" sz="1800" b="1" dirty="0" err="1"/>
+              <a:t>OnlineScoreSightLambda</a:t>
+            </a:r>
+            <a:r>
+              <a:rPr lang="en-US" sz="1800" b="1" dirty="0"/>
+              <a:t>) </a:t>
+            </a:r>
+            <a:r>
+              <a:rPr lang="en-US" sz="1800" dirty="0"/>
+              <a:t>connects it to the API Gateway.</a:t>
+            </a:r>
+          </a:p>
+          <a:p>
+            <a:pPr lvl="1"/>
+            <a:r>
+              <a:rPr lang="en-US" b="1" dirty="0"/>
+              <a:t>Batching Prediction: </a:t>
+            </a:r>
+            <a:r>
+              <a:rPr lang="en-US" dirty="0" err="1"/>
+              <a:t>SageMaker</a:t>
+            </a:r>
+            <a:r>
+              <a:rPr lang="en-US" dirty="0"/>
+              <a:t> Batch Transform handles batch prediction tasks. The results are conveyed to the API Gateway through a Lambda function (</a:t>
+            </a:r>
+            <a:r>
+              <a:rPr lang="en-US" sz="1800" b="1" dirty="0" err="1"/>
+              <a:t>BatchScoreSightLambda</a:t>
+            </a:r>
+            <a:r>
+              <a:rPr lang="en-US" sz="1800" dirty="0"/>
+              <a:t>).</a:t>
+            </a:r>
+          </a:p>
+          <a:p>
+            <a:pPr marL="128016" lvl="1" indent="0">
+              <a:buNone/>
+            </a:pPr>
+            <a:endParaRPr lang="en-US" sz="3200" b="1" dirty="0"/>
+          </a:p>
+          <a:p>
+            <a:pPr marL="128016" lvl="1" indent="0">
+              <a:buNone/>
+            </a:pPr>
+            <a:r>
+              <a:rPr lang="en-US" sz="2400" b="1" dirty="0"/>
+              <a:t>5. Monitoring, Logging and Notifications:</a:t>
+            </a:r>
+          </a:p>
+          <a:p>
+            <a:pPr lvl="1"/>
+            <a:r>
+              <a:rPr lang="en-US" b="1" dirty="0"/>
+              <a:t>CloudWatch: </a:t>
+            </a:r>
+            <a:r>
+              <a:rPr lang="en-US" dirty="0"/>
+              <a:t>Oversees the health and performance of services.</a:t>
+            </a:r>
+          </a:p>
+          <a:p>
+            <a:pPr lvl="1"/>
+            <a:r>
+              <a:rPr lang="en-US" b="1" dirty="0"/>
+              <a:t>Datadog: </a:t>
+            </a:r>
+            <a:r>
+              <a:rPr lang="en-US" dirty="0"/>
+              <a:t>Provides a deeper dive into monitoring, logging, and visualization.</a:t>
+            </a:r>
+          </a:p>
+          <a:p>
+            <a:pPr lvl="1"/>
+            <a:r>
+              <a:rPr lang="en-US" b="1" dirty="0"/>
+              <a:t>SNS (Simple Notification Service): </a:t>
+            </a:r>
+            <a:r>
+              <a:rPr lang="en-US" dirty="0"/>
+              <a:t>Sends email notifications in cases loke job </a:t>
+            </a:r>
+            <a:r>
+              <a:rPr lang="en-US" dirty="0" err="1"/>
+              <a:t>completitions</a:t>
+            </a:r>
+            <a:r>
+              <a:rPr lang="en-US" dirty="0"/>
+              <a:t>, error, or any other critical events</a:t>
+            </a:r>
+            <a:endParaRPr lang="en-US" b="1" dirty="0"/>
+          </a:p>
+          <a:p>
+            <a:endParaRPr lang="en-US" b="1" dirty="0"/>
+          </a:p>
+          <a:p>
+            <a:pPr>
+              <a:buFont typeface="Wingdings" panose="05000000000000000000" pitchFamily="2" charset="2"/>
+              <a:buChar char="§"/>
+            </a:pPr>
+            <a:endParaRPr lang="en-US" sz="1800" b="1" dirty="0"/>
+          </a:p>
+          <a:p>
+            <a:pPr marL="0" indent="0">
+              <a:buNone/>
+            </a:pPr>
+            <a:endParaRPr lang="en-US" sz="1800" b="1" dirty="0"/>
+          </a:p>
+        </p:txBody>
+      </p:sp>
+    </p:spTree>
+    <p:extLst>
+      <p:ext uri="{BB962C8B-B14F-4D97-AF65-F5344CB8AC3E}">
+        <p14:creationId xmlns:p14="http://schemas.microsoft.com/office/powerpoint/2010/main" val="1744503538"/>
+      </p:ext>
+    </p:extLst>
+  </p:cSld>
+  <p:clrMapOvr>
+    <a:masterClrMapping/>
+  </p:clrMapOvr>
+</p:sld>
+</file>
+
+<file path=ppt/slides/slide9.xml><?xml version="1.0" encoding="utf-8"?>
+<p:sld xmlns:a="http://schemas.openxmlformats.org/drawingml/2006/main" xmlns:r="http://schemas.openxmlformats.org/officeDocument/2006/relationships" xmlns:p="http://schemas.openxmlformats.org/presentationml/2006/main">
+  <p:cSld>
+    <p:spTree>
+      <p:nvGrpSpPr>
+        <p:cNvPr id="1" name=""/>
+        <p:cNvGrpSpPr/>
+        <p:nvPr/>
+      </p:nvGrpSpPr>
+      <p:grpSpPr>
+        <a:xfrm>
+          <a:off x="0" y="0"/>
+          <a:ext cx="0" cy="0"/>
+          <a:chOff x="0" y="0"/>
+          <a:chExt cx="0" cy="0"/>
+        </a:xfrm>
+      </p:grpSpPr>
+      <p:sp>
+        <p:nvSpPr>
+          <p:cNvPr id="2" name="Title 1">
+            <a:extLst>
+              <a:ext uri="{FF2B5EF4-FFF2-40B4-BE49-F238E27FC236}">
+                <a16:creationId xmlns:a16="http://schemas.microsoft.com/office/drawing/2014/main" id="{B42A17A7-0BB0-76ED-9DBC-C9B1299D3B0F}"/>
+              </a:ext>
+            </a:extLst>
+          </p:cNvPr>
+          <p:cNvSpPr>
+            <a:spLocks noGrp="1"/>
+          </p:cNvSpPr>
+          <p:nvPr>
+            <p:ph type="title"/>
+          </p:nvPr>
+        </p:nvSpPr>
+        <p:spPr/>
+        <p:txBody>
+          <a:bodyPr/>
+          <a:lstStyle/>
+          <a:p>
+            <a:r>
+              <a:rPr lang="en-US" dirty="0"/>
+              <a:t>Service Architecture</a:t>
+            </a:r>
+          </a:p>
+        </p:txBody>
+      </p:sp>
+      <p:sp>
+        <p:nvSpPr>
+          <p:cNvPr id="3" name="Content Placeholder 2">
+            <a:extLst>
+              <a:ext uri="{FF2B5EF4-FFF2-40B4-BE49-F238E27FC236}">
+                <a16:creationId xmlns:a16="http://schemas.microsoft.com/office/drawing/2014/main" id="{CC4ADBE9-DCEA-6B28-C60B-DD4B8E7D666F}"/>
+              </a:ext>
+            </a:extLst>
+          </p:cNvPr>
+          <p:cNvSpPr>
+            <a:spLocks noGrp="1"/>
+          </p:cNvSpPr>
+          <p:nvPr>
+            <p:ph idx="1"/>
+          </p:nvPr>
+        </p:nvSpPr>
+        <p:spPr>
+          <a:xfrm>
+            <a:off x="827314" y="1981200"/>
+            <a:ext cx="9916888" cy="4328160"/>
+          </a:xfrm>
+        </p:spPr>
+        <p:txBody>
+          <a:bodyPr>
+            <a:normAutofit fontScale="62500" lnSpcReduction="20000"/>
+          </a:bodyPr>
+          <a:lstStyle/>
+          <a:p>
+            <a:r>
+              <a:rPr lang="en-US" sz="3500" b="1" dirty="0"/>
+              <a:t>6. Orchestration and Automation:</a:t>
+            </a:r>
+          </a:p>
+          <a:p>
+            <a:pPr>
+              <a:buFont typeface="Wingdings" panose="05000000000000000000" pitchFamily="2" charset="2"/>
+              <a:buChar char="§"/>
+            </a:pPr>
+            <a:r>
+              <a:rPr lang="en-US" sz="2400" b="1" dirty="0"/>
+              <a:t> </a:t>
+            </a:r>
+            <a:r>
+              <a:rPr lang="en-US" sz="2900" b="1" dirty="0"/>
+              <a:t>Step Function: </a:t>
+            </a:r>
+            <a:r>
+              <a:rPr lang="en-US" sz="2900" dirty="0"/>
+              <a:t>Oversees and arranges the order of operations across services and data processing stages.</a:t>
+            </a:r>
+          </a:p>
+          <a:p>
+            <a:endParaRPr lang="en-US" sz="2400" dirty="0"/>
+          </a:p>
+          <a:p>
+            <a:r>
+              <a:rPr lang="en-US" sz="3500" b="1" dirty="0"/>
+              <a:t>7. CI/CD Pipeline:</a:t>
+            </a:r>
+          </a:p>
+          <a:p>
+            <a:pPr>
+              <a:buFont typeface="Wingdings" panose="05000000000000000000" pitchFamily="2" charset="2"/>
+              <a:buChar char="§"/>
+            </a:pPr>
+            <a:r>
+              <a:rPr lang="en-US" sz="2400" b="1" dirty="0"/>
+              <a:t> </a:t>
+            </a:r>
+            <a:r>
+              <a:rPr lang="en-US" sz="2900" b="1" dirty="0"/>
+              <a:t>GitHub: </a:t>
+            </a:r>
+            <a:r>
+              <a:rPr lang="en-US" sz="2900" dirty="0"/>
+              <a:t>Repository for code, ensuring version control.</a:t>
+            </a:r>
+          </a:p>
+          <a:p>
+            <a:pPr>
+              <a:buFont typeface="Wingdings" panose="05000000000000000000" pitchFamily="2" charset="2"/>
+              <a:buChar char="§"/>
+            </a:pPr>
+            <a:r>
+              <a:rPr lang="en-US" sz="2900" b="1" dirty="0"/>
+              <a:t> Bamboo: </a:t>
+            </a:r>
+            <a:r>
+              <a:rPr lang="en-US" sz="2900" dirty="0"/>
+              <a:t>Oversees the automated build and deployment procedure, validating that code adjustments are tested and deployed efficiently.</a:t>
+            </a:r>
+          </a:p>
+          <a:p>
+            <a:pPr>
+              <a:buFont typeface="Wingdings" panose="05000000000000000000" pitchFamily="2" charset="2"/>
+              <a:buChar char="§"/>
+            </a:pPr>
+            <a:endParaRPr lang="en-US" b="1" dirty="0"/>
+          </a:p>
+          <a:p>
+            <a:pPr marL="0" indent="0">
+              <a:buNone/>
+            </a:pPr>
+            <a:r>
+              <a:rPr lang="en-US" sz="3500" b="1" dirty="0"/>
+              <a:t>8. Testing:</a:t>
+            </a:r>
+          </a:p>
+          <a:p>
+            <a:pPr>
+              <a:buFont typeface="Wingdings" panose="05000000000000000000" pitchFamily="2" charset="2"/>
+              <a:buChar char="§"/>
+            </a:pPr>
+            <a:r>
+              <a:rPr lang="en-US" sz="2900" b="1" dirty="0"/>
+              <a:t> </a:t>
+            </a:r>
+            <a:r>
+              <a:rPr lang="en-US" sz="2900" b="1" dirty="0" err="1"/>
+              <a:t>PyTest</a:t>
+            </a:r>
+            <a:r>
+              <a:rPr lang="en-US" sz="2900" b="1" dirty="0"/>
+              <a:t>: </a:t>
+            </a:r>
+            <a:r>
+              <a:rPr lang="en-US" sz="2900" dirty="0" err="1"/>
+              <a:t>PyTest</a:t>
+            </a:r>
+            <a:r>
+              <a:rPr lang="en-US" sz="2900" dirty="0"/>
+              <a:t> is suitable for unit testing your scripts and application logic.</a:t>
+            </a:r>
+          </a:p>
+          <a:p>
+            <a:pPr>
+              <a:buFont typeface="Wingdings" panose="05000000000000000000" pitchFamily="2" charset="2"/>
+              <a:buChar char="§"/>
+            </a:pPr>
+            <a:r>
+              <a:rPr lang="en-US" sz="2900" b="1" dirty="0"/>
+              <a:t> Postman: </a:t>
+            </a:r>
+            <a:r>
+              <a:rPr lang="en-US" sz="2900" dirty="0"/>
+              <a:t>For Api endpoint testing to ensure that the endpoints, especially from API Gateway, are functioning as expected.</a:t>
+            </a:r>
+            <a:endParaRPr lang="en-US" sz="2900" b="1" dirty="0"/>
+          </a:p>
+          <a:p>
+            <a:endParaRPr lang="en-US" dirty="0"/>
+          </a:p>
+        </p:txBody>
+      </p:sp>
+    </p:spTree>
+    <p:extLst>
+      <p:ext uri="{BB962C8B-B14F-4D97-AF65-F5344CB8AC3E}">
+        <p14:creationId xmlns:p14="http://schemas.microsoft.com/office/powerpoint/2010/main" val="209465863"/>
       </p:ext>
     </p:extLst>
   </p:cSld>

</xml_diff>